<commit_message>
updates to reflect latest results
</commit_message>
<xml_diff>
--- a/Scripts/test_manual_shapes.pptx
+++ b/Scripts/test_manual_shapes.pptx
@@ -13477,7 +13477,7 @@
     </cdr:to>
     <cdr:sp macro="" textlink="">
       <cdr:nvSpPr>
-        <cdr:cNvPr id="16" name="TopN 0"/>
+        <cdr:cNvPr id="8" name="TopN 0"/>
         <cdr:cNvSpPr txBox="1"/>
       </cdr:nvSpPr>
       <cdr:spPr>
@@ -13500,6 +13500,7 @@
             <a:rPr lang="en-GB" sz="1100"/>
             <a:t>10.3%</a:t>
           </a:r>
+          <a:endParaRPr lang="en-GB" sz="1100"/>
         </a:p>
       </cdr:txBody>
     </cdr:sp>
@@ -13515,7 +13516,7 @@
     </cdr:to>
     <cdr:sp macro="" textlink="">
       <cdr:nvSpPr>
-        <cdr:cNvPr id="17" name="TopN 1"/>
+        <cdr:cNvPr id="9" name="TopN 1"/>
         <cdr:cNvSpPr txBox="1"/>
       </cdr:nvSpPr>
       <cdr:spPr>
@@ -13538,6 +13539,7 @@
             <a:rPr lang="en-GB" sz="1100"/>
             <a:t>12.5%</a:t>
           </a:r>
+          <a:endParaRPr lang="en-GB" sz="1100"/>
         </a:p>
       </cdr:txBody>
     </cdr:sp>
@@ -13553,7 +13555,7 @@
     </cdr:to>
     <cdr:sp macro="" textlink="">
       <cdr:nvSpPr>
-        <cdr:cNvPr id="19" name="TopN 2"/>
+        <cdr:cNvPr id="10" name="TopN 2"/>
         <cdr:cNvSpPr txBox="1"/>
       </cdr:nvSpPr>
       <cdr:spPr>
@@ -13576,6 +13578,7 @@
             <a:rPr lang="en-GB" sz="1100"/>
             <a:t>8.7%</a:t>
           </a:r>
+          <a:endParaRPr lang="en-GB" sz="1100"/>
         </a:p>
       </cdr:txBody>
     </cdr:sp>
@@ -13591,7 +13594,7 @@
     </cdr:to>
     <cdr:sp macro="" textlink="">
       <cdr:nvSpPr>
-        <cdr:cNvPr id="20" name="TopN 3"/>
+        <cdr:cNvPr id="13" name="TopN 3"/>
         <cdr:cNvSpPr txBox="1"/>
       </cdr:nvSpPr>
       <cdr:spPr>
@@ -13614,6 +13617,7 @@
             <a:rPr lang="en-GB" sz="1100"/>
             <a:t>29.6%</a:t>
           </a:r>
+          <a:endParaRPr lang="en-GB" sz="1100"/>
         </a:p>
       </cdr:txBody>
     </cdr:sp>
@@ -13629,7 +13633,7 @@
     </cdr:to>
     <cdr:sp macro="" textlink="">
       <cdr:nvSpPr>
-        <cdr:cNvPr id="21" name="TopN 4"/>
+        <cdr:cNvPr id="14" name="TopN 4"/>
         <cdr:cNvSpPr txBox="1"/>
       </cdr:nvSpPr>
       <cdr:spPr>
@@ -13652,6 +13656,7 @@
             <a:rPr lang="en-GB" sz="1100"/>
             <a:t>22.2%</a:t>
           </a:r>
+          <a:endParaRPr lang="en-GB" sz="1100"/>
         </a:p>
       </cdr:txBody>
     </cdr:sp>
@@ -13667,7 +13672,7 @@
     </cdr:to>
     <cdr:sp macro="" textlink="">
       <cdr:nvSpPr>
-        <cdr:cNvPr id="22" name="TopN 5"/>
+        <cdr:cNvPr id="15" name="TopN 5"/>
         <cdr:cNvSpPr txBox="1"/>
       </cdr:nvSpPr>
       <cdr:spPr>
@@ -13690,6 +13695,7 @@
             <a:rPr lang="en-GB" sz="1100"/>
             <a:t>30.0%</a:t>
           </a:r>
+          <a:endParaRPr lang="en-GB" sz="1100"/>
         </a:p>
       </cdr:txBody>
     </cdr:sp>
@@ -14011,7 +14017,7 @@
     </cdr:to>
     <cdr:sp macro="" textlink="">
       <cdr:nvSpPr>
-        <cdr:cNvPr id="23" name="TopN 0"/>
+        <cdr:cNvPr id="8" name="TopN 0"/>
         <cdr:cNvSpPr txBox="1"/>
       </cdr:nvSpPr>
       <cdr:spPr>
@@ -14034,6 +14040,7 @@
             <a:rPr lang="en-GB" sz="1100"/>
             <a:t>10.3%</a:t>
           </a:r>
+          <a:endParaRPr lang="en-GB" sz="1100"/>
         </a:p>
       </cdr:txBody>
     </cdr:sp>
@@ -14049,7 +14056,7 @@
     </cdr:to>
     <cdr:sp macro="" textlink="">
       <cdr:nvSpPr>
-        <cdr:cNvPr id="25" name="TopN 1"/>
+        <cdr:cNvPr id="9" name="TopN 1"/>
         <cdr:cNvSpPr txBox="1"/>
       </cdr:nvSpPr>
       <cdr:spPr>
@@ -14072,6 +14079,7 @@
             <a:rPr lang="en-GB" sz="1100"/>
             <a:t>12.5%</a:t>
           </a:r>
+          <a:endParaRPr lang="en-GB" sz="1100"/>
         </a:p>
       </cdr:txBody>
     </cdr:sp>
@@ -14087,7 +14095,7 @@
     </cdr:to>
     <cdr:sp macro="" textlink="">
       <cdr:nvSpPr>
-        <cdr:cNvPr id="26" name="TopN 2"/>
+        <cdr:cNvPr id="10" name="TopN 2"/>
         <cdr:cNvSpPr txBox="1"/>
       </cdr:nvSpPr>
       <cdr:spPr>
@@ -14110,6 +14118,7 @@
             <a:rPr lang="en-GB" sz="1100"/>
             <a:t>8.7%</a:t>
           </a:r>
+          <a:endParaRPr lang="en-GB" sz="1100"/>
         </a:p>
       </cdr:txBody>
     </cdr:sp>
@@ -14125,7 +14134,7 @@
     </cdr:to>
     <cdr:sp macro="" textlink="">
       <cdr:nvSpPr>
-        <cdr:cNvPr id="27" name="TopN 3"/>
+        <cdr:cNvPr id="13" name="TopN 3"/>
         <cdr:cNvSpPr txBox="1"/>
       </cdr:nvSpPr>
       <cdr:spPr>
@@ -14148,6 +14157,7 @@
             <a:rPr lang="en-GB" sz="1100"/>
             <a:t>29.6%</a:t>
           </a:r>
+          <a:endParaRPr lang="en-GB" sz="1100"/>
         </a:p>
       </cdr:txBody>
     </cdr:sp>
@@ -14163,7 +14173,7 @@
     </cdr:to>
     <cdr:sp macro="" textlink="">
       <cdr:nvSpPr>
-        <cdr:cNvPr id="28" name="TopN 4"/>
+        <cdr:cNvPr id="14" name="TopN 4"/>
         <cdr:cNvSpPr txBox="1"/>
       </cdr:nvSpPr>
       <cdr:spPr>
@@ -14186,6 +14196,7 @@
             <a:rPr lang="en-GB" sz="1100"/>
             <a:t>22.2%</a:t>
           </a:r>
+          <a:endParaRPr lang="en-GB" sz="1100"/>
         </a:p>
       </cdr:txBody>
     </cdr:sp>
@@ -14201,7 +14212,7 @@
     </cdr:to>
     <cdr:sp macro="" textlink="">
       <cdr:nvSpPr>
-        <cdr:cNvPr id="29" name="TopN 5"/>
+        <cdr:cNvPr id="15" name="TopN 5"/>
         <cdr:cNvSpPr txBox="1"/>
       </cdr:nvSpPr>
       <cdr:spPr>
@@ -14224,6 +14235,7 @@
             <a:rPr lang="en-GB" sz="1100"/>
             <a:t>30.0%</a:t>
           </a:r>
+          <a:endParaRPr lang="en-GB" sz="1100"/>
         </a:p>
       </cdr:txBody>
     </cdr:sp>
@@ -14565,10 +14577,9 @@
         <a:p xmlns:a="http://schemas.openxmlformats.org/drawingml/2006/main">
           <a:pPr algn="r"/>
           <a:r>
-            <a:rPr lang="en-GB" sz="1100"/>
+            <a:rPr lang="en-GB" sz="1100" dirty="0"/>
             <a:t>Age Under 20</a:t>
           </a:r>
-          <a:endParaRPr lang="en-GB" sz="1100" dirty="0"/>
         </a:p>
       </cdr:txBody>
     </cdr:sp>
@@ -14604,10 +14615,9 @@
         <a:p xmlns:a="http://schemas.openxmlformats.org/drawingml/2006/main">
           <a:pPr algn="r"/>
           <a:r>
-            <a:rPr lang="en-GB" sz="1100"/>
+            <a:rPr lang="en-GB" sz="1100" dirty="0"/>
             <a:t>Age 20-25</a:t>
           </a:r>
-          <a:endParaRPr lang="en-GB" sz="1100" dirty="0"/>
         </a:p>
       </cdr:txBody>
     </cdr:sp>
@@ -14902,7 +14912,7 @@
           <a:p>
             <a:fld id="{E482DFA6-6B95-4553-B7D7-11376DF2CCB4}" type="datetimeFigureOut">
               <a:rPr lang="en-GB" smtClean="0"/>
-              <a:t>12/08/2016</a:t>
+              <a:t>27/10/2016</a:t>
             </a:fld>
             <a:endParaRPr lang="en-GB"/>
           </a:p>
@@ -15072,7 +15082,7 @@
           <a:p>
             <a:fld id="{E482DFA6-6B95-4553-B7D7-11376DF2CCB4}" type="datetimeFigureOut">
               <a:rPr lang="en-GB" smtClean="0"/>
-              <a:t>12/08/2016</a:t>
+              <a:t>27/10/2016</a:t>
             </a:fld>
             <a:endParaRPr lang="en-GB"/>
           </a:p>
@@ -15252,7 +15262,7 @@
           <a:p>
             <a:fld id="{E482DFA6-6B95-4553-B7D7-11376DF2CCB4}" type="datetimeFigureOut">
               <a:rPr lang="en-GB" smtClean="0"/>
-              <a:t>12/08/2016</a:t>
+              <a:t>27/10/2016</a:t>
             </a:fld>
             <a:endParaRPr lang="en-GB"/>
           </a:p>
@@ -15422,7 +15432,7 @@
           <a:p>
             <a:fld id="{E482DFA6-6B95-4553-B7D7-11376DF2CCB4}" type="datetimeFigureOut">
               <a:rPr lang="en-GB" smtClean="0"/>
-              <a:t>12/08/2016</a:t>
+              <a:t>27/10/2016</a:t>
             </a:fld>
             <a:endParaRPr lang="en-GB"/>
           </a:p>
@@ -15668,7 +15678,7 @@
           <a:p>
             <a:fld id="{E482DFA6-6B95-4553-B7D7-11376DF2CCB4}" type="datetimeFigureOut">
               <a:rPr lang="en-GB" smtClean="0"/>
-              <a:t>12/08/2016</a:t>
+              <a:t>27/10/2016</a:t>
             </a:fld>
             <a:endParaRPr lang="en-GB"/>
           </a:p>
@@ -15900,7 +15910,7 @@
           <a:p>
             <a:fld id="{E482DFA6-6B95-4553-B7D7-11376DF2CCB4}" type="datetimeFigureOut">
               <a:rPr lang="en-GB" smtClean="0"/>
-              <a:t>12/08/2016</a:t>
+              <a:t>27/10/2016</a:t>
             </a:fld>
             <a:endParaRPr lang="en-GB"/>
           </a:p>
@@ -16267,7 +16277,7 @@
           <a:p>
             <a:fld id="{E482DFA6-6B95-4553-B7D7-11376DF2CCB4}" type="datetimeFigureOut">
               <a:rPr lang="en-GB" smtClean="0"/>
-              <a:t>12/08/2016</a:t>
+              <a:t>27/10/2016</a:t>
             </a:fld>
             <a:endParaRPr lang="en-GB"/>
           </a:p>
@@ -16385,7 +16395,7 @@
           <a:p>
             <a:fld id="{E482DFA6-6B95-4553-B7D7-11376DF2CCB4}" type="datetimeFigureOut">
               <a:rPr lang="en-GB" smtClean="0"/>
-              <a:t>12/08/2016</a:t>
+              <a:t>27/10/2016</a:t>
             </a:fld>
             <a:endParaRPr lang="en-GB"/>
           </a:p>
@@ -16480,7 +16490,7 @@
           <a:p>
             <a:fld id="{E482DFA6-6B95-4553-B7D7-11376DF2CCB4}" type="datetimeFigureOut">
               <a:rPr lang="en-GB" smtClean="0"/>
-              <a:t>12/08/2016</a:t>
+              <a:t>27/10/2016</a:t>
             </a:fld>
             <a:endParaRPr lang="en-GB"/>
           </a:p>
@@ -16757,7 +16767,7 @@
           <a:p>
             <a:fld id="{E482DFA6-6B95-4553-B7D7-11376DF2CCB4}" type="datetimeFigureOut">
               <a:rPr lang="en-GB" smtClean="0"/>
-              <a:t>12/08/2016</a:t>
+              <a:t>27/10/2016</a:t>
             </a:fld>
             <a:endParaRPr lang="en-GB"/>
           </a:p>
@@ -17010,7 +17020,7 @@
           <a:p>
             <a:fld id="{E482DFA6-6B95-4553-B7D7-11376DF2CCB4}" type="datetimeFigureOut">
               <a:rPr lang="en-GB" smtClean="0"/>
-              <a:t>12/08/2016</a:t>
+              <a:t>27/10/2016</a:t>
             </a:fld>
             <a:endParaRPr lang="en-GB"/>
           </a:p>
@@ -17223,7 +17233,7 @@
           <a:p>
             <a:fld id="{E482DFA6-6B95-4553-B7D7-11376DF2CCB4}" type="datetimeFigureOut">
               <a:rPr lang="en-GB" smtClean="0"/>
-              <a:t>12/08/2016</a:t>
+              <a:t>27/10/2016</a:t>
             </a:fld>
             <a:endParaRPr lang="en-GB"/>
           </a:p>
@@ -18867,7 +18877,7 @@
                 </a:tc>
                 <a:extLst>
                   <a:ext uri="{0D108BD9-81ED-4DB2-BD59-A6C34878D82A}">
-                    <a16:rowId xmlns:a16="http://schemas.microsoft.com/office/drawing/2014/main" val="1461127939"/>
+                    <a16:rowId xmlns:a16="http://schemas.microsoft.com/office/drawing/2014/main" val="360635289"/>
                   </a:ext>
                 </a:extLst>
               </a:tr>
@@ -18888,10 +18898,9 @@
                     <a:lstStyle/>
                     <a:p>
                       <a:r>
-                        <a:rPr lang="en-GB" sz="1600"/>
+                        <a:rPr lang="en-GB" sz="1600" dirty="0"/>
                         <a:t>Male</a:t>
                       </a:r>
-                      <a:endParaRPr lang="en-GB" sz="1600" dirty="0"/>
                     </a:p>
                   </a:txBody>
                   <a:tcPr>
@@ -18980,7 +18989,7 @@
                 </a:tc>
                 <a:extLst>
                   <a:ext uri="{0D108BD9-81ED-4DB2-BD59-A6C34878D82A}">
-                    <a16:rowId xmlns:a16="http://schemas.microsoft.com/office/drawing/2014/main" val="404231348"/>
+                    <a16:rowId xmlns:a16="http://schemas.microsoft.com/office/drawing/2014/main" val="1309131046"/>
                   </a:ext>
                 </a:extLst>
               </a:tr>
@@ -19097,7 +19106,7 @@
                 </a:tc>
                 <a:extLst>
                   <a:ext uri="{0D108BD9-81ED-4DB2-BD59-A6C34878D82A}">
-                    <a16:rowId xmlns:a16="http://schemas.microsoft.com/office/drawing/2014/main" val="1309131046"/>
+                    <a16:rowId xmlns:a16="http://schemas.microsoft.com/office/drawing/2014/main" val="2459626008"/>
                   </a:ext>
                 </a:extLst>
               </a:tr>
@@ -19146,9 +19155,10 @@
                     <a:lstStyle/>
                     <a:p>
                       <a:r>
-                        <a:rPr lang="en-GB" sz="1600" dirty="0"/>
+                        <a:rPr lang="en-GB" sz="1600"/>
                         <a:t>12.8%</a:t>
                       </a:r>
+                      <a:endParaRPr lang="en-GB" sz="1600" dirty="0"/>
                     </a:p>
                   </a:txBody>
                   <a:tcPr>
@@ -19213,7 +19223,7 @@
                 </a:tc>
                 <a:extLst>
                   <a:ext uri="{0D108BD9-81ED-4DB2-BD59-A6C34878D82A}">
-                    <a16:rowId xmlns:a16="http://schemas.microsoft.com/office/drawing/2014/main" val="2459626008"/>
+                    <a16:rowId xmlns:a16="http://schemas.microsoft.com/office/drawing/2014/main" val="2929855217"/>
                   </a:ext>
                 </a:extLst>
               </a:tr>
@@ -19330,7 +19340,7 @@
                 </a:tc>
                 <a:extLst>
                   <a:ext uri="{0D108BD9-81ED-4DB2-BD59-A6C34878D82A}">
-                    <a16:rowId xmlns:a16="http://schemas.microsoft.com/office/drawing/2014/main" val="2929855217"/>
+                    <a16:rowId xmlns:a16="http://schemas.microsoft.com/office/drawing/2014/main" val="1512516203"/>
                   </a:ext>
                 </a:extLst>
               </a:tr>
@@ -19447,7 +19457,7 @@
                 </a:tc>
                 <a:extLst>
                   <a:ext uri="{0D108BD9-81ED-4DB2-BD59-A6C34878D82A}">
-                    <a16:rowId xmlns:a16="http://schemas.microsoft.com/office/drawing/2014/main" val="1512516203"/>
+                    <a16:rowId xmlns:a16="http://schemas.microsoft.com/office/drawing/2014/main" val="1350076109"/>
                   </a:ext>
                 </a:extLst>
               </a:tr>
@@ -19564,7 +19574,7 @@
                 </a:tc>
                 <a:extLst>
                   <a:ext uri="{0D108BD9-81ED-4DB2-BD59-A6C34878D82A}">
-                    <a16:rowId xmlns:a16="http://schemas.microsoft.com/office/drawing/2014/main" val="1350076109"/>
+                    <a16:rowId xmlns:a16="http://schemas.microsoft.com/office/drawing/2014/main" val="1517412287"/>
                   </a:ext>
                 </a:extLst>
               </a:tr>
@@ -19681,7 +19691,7 @@
                 </a:tc>
                 <a:extLst>
                   <a:ext uri="{0D108BD9-81ED-4DB2-BD59-A6C34878D82A}">
-                    <a16:rowId xmlns:a16="http://schemas.microsoft.com/office/drawing/2014/main" val="1517412287"/>
+                    <a16:rowId xmlns:a16="http://schemas.microsoft.com/office/drawing/2014/main" val="1013156906"/>
                   </a:ext>
                 </a:extLst>
               </a:tr>
@@ -19798,7 +19808,7 @@
                 </a:tc>
                 <a:extLst>
                   <a:ext uri="{0D108BD9-81ED-4DB2-BD59-A6C34878D82A}">
-                    <a16:rowId xmlns:a16="http://schemas.microsoft.com/office/drawing/2014/main" val="1013156906"/>
+                    <a16:rowId xmlns:a16="http://schemas.microsoft.com/office/drawing/2014/main" val="946304626"/>
                   </a:ext>
                 </a:extLst>
               </a:tr>
@@ -19915,7 +19925,7 @@
                 </a:tc>
                 <a:extLst>
                   <a:ext uri="{0D108BD9-81ED-4DB2-BD59-A6C34878D82A}">
-                    <a16:rowId xmlns:a16="http://schemas.microsoft.com/office/drawing/2014/main" val="946304626"/>
+                    <a16:rowId xmlns:a16="http://schemas.microsoft.com/office/drawing/2014/main" val="80993878"/>
                   </a:ext>
                 </a:extLst>
               </a:tr>
@@ -20032,7 +20042,7 @@
                 </a:tc>
                 <a:extLst>
                   <a:ext uri="{0D108BD9-81ED-4DB2-BD59-A6C34878D82A}">
-                    <a16:rowId xmlns:a16="http://schemas.microsoft.com/office/drawing/2014/main" val="1779039832"/>
+                    <a16:rowId xmlns:a16="http://schemas.microsoft.com/office/drawing/2014/main" val="291397703"/>
                   </a:ext>
                 </a:extLst>
               </a:tr>
@@ -20129,9 +20139,10 @@
                     <a:lstStyle/>
                     <a:p>
                       <a:r>
-                        <a:rPr lang="en-GB" sz="1600" dirty="0"/>
+                        <a:rPr lang="en-GB" sz="1600"/>
                         <a:t>12.5%</a:t>
                       </a:r>
+                      <a:endParaRPr lang="en-GB" sz="1600" dirty="0"/>
                     </a:p>
                   </a:txBody>
                   <a:tcPr>
@@ -20148,7 +20159,7 @@
                 </a:tc>
                 <a:extLst>
                   <a:ext uri="{0D108BD9-81ED-4DB2-BD59-A6C34878D82A}">
-                    <a16:rowId xmlns:a16="http://schemas.microsoft.com/office/drawing/2014/main" val="2432056634"/>
+                    <a16:rowId xmlns:a16="http://schemas.microsoft.com/office/drawing/2014/main" val="3198379306"/>
                   </a:ext>
                 </a:extLst>
               </a:tr>
@@ -21258,7 +21269,7 @@
                 </a:tc>
                 <a:extLst>
                   <a:ext uri="{0D108BD9-81ED-4DB2-BD59-A6C34878D82A}">
-                    <a16:rowId xmlns:a16="http://schemas.microsoft.com/office/drawing/2014/main" val="3163806072"/>
+                    <a16:rowId xmlns:a16="http://schemas.microsoft.com/office/drawing/2014/main" val="4243433279"/>
                   </a:ext>
                 </a:extLst>
               </a:tr>
@@ -21327,7 +21338,7 @@
                 </a:tc>
                 <a:extLst>
                   <a:ext uri="{0D108BD9-81ED-4DB2-BD59-A6C34878D82A}">
-                    <a16:rowId xmlns:a16="http://schemas.microsoft.com/office/drawing/2014/main" val="876211350"/>
+                    <a16:rowId xmlns:a16="http://schemas.microsoft.com/office/drawing/2014/main" val="622119300"/>
                   </a:ext>
                 </a:extLst>
               </a:tr>
@@ -21396,7 +21407,7 @@
                 </a:tc>
                 <a:extLst>
                   <a:ext uri="{0D108BD9-81ED-4DB2-BD59-A6C34878D82A}">
-                    <a16:rowId xmlns:a16="http://schemas.microsoft.com/office/drawing/2014/main" val="1129996843"/>
+                    <a16:rowId xmlns:a16="http://schemas.microsoft.com/office/drawing/2014/main" val="3163806072"/>
                   </a:ext>
                 </a:extLst>
               </a:tr>
@@ -21457,7 +21468,7 @@
                 </a:tc>
                 <a:extLst>
                   <a:ext uri="{0D108BD9-81ED-4DB2-BD59-A6C34878D82A}">
-                    <a16:rowId xmlns:a16="http://schemas.microsoft.com/office/drawing/2014/main" val="2240362847"/>
+                    <a16:rowId xmlns:a16="http://schemas.microsoft.com/office/drawing/2014/main" val="643246340"/>
                   </a:ext>
                 </a:extLst>
               </a:tr>
@@ -21526,7 +21537,7 @@
                 </a:tc>
                 <a:extLst>
                   <a:ext uri="{0D108BD9-81ED-4DB2-BD59-A6C34878D82A}">
-                    <a16:rowId xmlns:a16="http://schemas.microsoft.com/office/drawing/2014/main" val="559663573"/>
+                    <a16:rowId xmlns:a16="http://schemas.microsoft.com/office/drawing/2014/main" val="876211350"/>
                   </a:ext>
                 </a:extLst>
               </a:tr>
@@ -21595,7 +21606,7 @@
                 </a:tc>
                 <a:extLst>
                   <a:ext uri="{0D108BD9-81ED-4DB2-BD59-A6C34878D82A}">
-                    <a16:rowId xmlns:a16="http://schemas.microsoft.com/office/drawing/2014/main" val="3968925116"/>
+                    <a16:rowId xmlns:a16="http://schemas.microsoft.com/office/drawing/2014/main" val="3519371138"/>
                   </a:ext>
                 </a:extLst>
               </a:tr>
@@ -21656,7 +21667,7 @@
                 </a:tc>
                 <a:extLst>
                   <a:ext uri="{0D108BD9-81ED-4DB2-BD59-A6C34878D82A}">
-                    <a16:rowId xmlns:a16="http://schemas.microsoft.com/office/drawing/2014/main" val="3082888024"/>
+                    <a16:rowId xmlns:a16="http://schemas.microsoft.com/office/drawing/2014/main" val="1791100872"/>
                   </a:ext>
                 </a:extLst>
               </a:tr>
@@ -21725,7 +21736,7 @@
                 </a:tc>
                 <a:extLst>
                   <a:ext uri="{0D108BD9-81ED-4DB2-BD59-A6C34878D82A}">
-                    <a16:rowId xmlns:a16="http://schemas.microsoft.com/office/drawing/2014/main" val="3049177994"/>
+                    <a16:rowId xmlns:a16="http://schemas.microsoft.com/office/drawing/2014/main" val="1129996843"/>
                   </a:ext>
                 </a:extLst>
               </a:tr>
@@ -21794,7 +21805,7 @@
                 </a:tc>
                 <a:extLst>
                   <a:ext uri="{0D108BD9-81ED-4DB2-BD59-A6C34878D82A}">
-                    <a16:rowId xmlns:a16="http://schemas.microsoft.com/office/drawing/2014/main" val="1948744820"/>
+                    <a16:rowId xmlns:a16="http://schemas.microsoft.com/office/drawing/2014/main" val="2240362847"/>
                   </a:ext>
                 </a:extLst>
               </a:tr>
@@ -21855,7 +21866,7 @@
                 </a:tc>
                 <a:extLst>
                   <a:ext uri="{0D108BD9-81ED-4DB2-BD59-A6C34878D82A}">
-                    <a16:rowId xmlns:a16="http://schemas.microsoft.com/office/drawing/2014/main" val="4271020438"/>
+                    <a16:rowId xmlns:a16="http://schemas.microsoft.com/office/drawing/2014/main" val="955292522"/>
                   </a:ext>
                 </a:extLst>
               </a:tr>
@@ -21924,7 +21935,7 @@
                 </a:tc>
                 <a:extLst>
                   <a:ext uri="{0D108BD9-81ED-4DB2-BD59-A6C34878D82A}">
-                    <a16:rowId xmlns:a16="http://schemas.microsoft.com/office/drawing/2014/main" val="21850828"/>
+                    <a16:rowId xmlns:a16="http://schemas.microsoft.com/office/drawing/2014/main" val="2045745621"/>
                   </a:ext>
                 </a:extLst>
               </a:tr>
@@ -21993,7 +22004,7 @@
                 </a:tc>
                 <a:extLst>
                   <a:ext uri="{0D108BD9-81ED-4DB2-BD59-A6C34878D82A}">
-                    <a16:rowId xmlns:a16="http://schemas.microsoft.com/office/drawing/2014/main" val="1359258532"/>
+                    <a16:rowId xmlns:a16="http://schemas.microsoft.com/office/drawing/2014/main" val="559663573"/>
                   </a:ext>
                 </a:extLst>
               </a:tr>
@@ -22660,7 +22671,7 @@
                 </a:tc>
                 <a:extLst>
                   <a:ext uri="{0D108BD9-81ED-4DB2-BD59-A6C34878D82A}">
-                    <a16:rowId xmlns:a16="http://schemas.microsoft.com/office/drawing/2014/main" val="1935177345"/>
+                    <a16:rowId xmlns:a16="http://schemas.microsoft.com/office/drawing/2014/main" val="2457654891"/>
                   </a:ext>
                 </a:extLst>
               </a:tr>
@@ -22890,7 +22901,7 @@
                 </a:tc>
                 <a:extLst>
                   <a:ext uri="{0D108BD9-81ED-4DB2-BD59-A6C34878D82A}">
-                    <a16:rowId xmlns:a16="http://schemas.microsoft.com/office/drawing/2014/main" val="4238292108"/>
+                    <a16:rowId xmlns:a16="http://schemas.microsoft.com/office/drawing/2014/main" val="1619425367"/>
                   </a:ext>
                 </a:extLst>
               </a:tr>
@@ -23120,7 +23131,7 @@
                 </a:tc>
                 <a:extLst>
                   <a:ext uri="{0D108BD9-81ED-4DB2-BD59-A6C34878D82A}">
-                    <a16:rowId xmlns:a16="http://schemas.microsoft.com/office/drawing/2014/main" val="2911162899"/>
+                    <a16:rowId xmlns:a16="http://schemas.microsoft.com/office/drawing/2014/main" val="1935177345"/>
                   </a:ext>
                 </a:extLst>
               </a:tr>
@@ -23335,7 +23346,7 @@
                 </a:tc>
                 <a:extLst>
                   <a:ext uri="{0D108BD9-81ED-4DB2-BD59-A6C34878D82A}">
-                    <a16:rowId xmlns:a16="http://schemas.microsoft.com/office/drawing/2014/main" val="2741791382"/>
+                    <a16:rowId xmlns:a16="http://schemas.microsoft.com/office/drawing/2014/main" val="1064086314"/>
                   </a:ext>
                 </a:extLst>
               </a:tr>
@@ -23570,7 +23581,7 @@
                 </a:tc>
                 <a:extLst>
                   <a:ext uri="{0D108BD9-81ED-4DB2-BD59-A6C34878D82A}">
-                    <a16:rowId xmlns:a16="http://schemas.microsoft.com/office/drawing/2014/main" val="316541160"/>
+                    <a16:rowId xmlns:a16="http://schemas.microsoft.com/office/drawing/2014/main" val="4238292108"/>
                   </a:ext>
                 </a:extLst>
               </a:tr>
@@ -23785,7 +23796,7 @@
                 </a:tc>
                 <a:extLst>
                   <a:ext uri="{0D108BD9-81ED-4DB2-BD59-A6C34878D82A}">
-                    <a16:rowId xmlns:a16="http://schemas.microsoft.com/office/drawing/2014/main" val="2797302703"/>
+                    <a16:rowId xmlns:a16="http://schemas.microsoft.com/office/drawing/2014/main" val="1223760395"/>
                   </a:ext>
                 </a:extLst>
               </a:tr>
@@ -24015,7 +24026,7 @@
                 </a:tc>
                 <a:extLst>
                   <a:ext uri="{0D108BD9-81ED-4DB2-BD59-A6C34878D82A}">
-                    <a16:rowId xmlns:a16="http://schemas.microsoft.com/office/drawing/2014/main" val="1342106099"/>
+                    <a16:rowId xmlns:a16="http://schemas.microsoft.com/office/drawing/2014/main" val="2422315297"/>
                   </a:ext>
                 </a:extLst>
               </a:tr>
@@ -24328,7 +24339,7 @@
         </p:nvSpPr>
         <p:spPr>
           <a:xfrm>
-            <a:off x="1240972" y="3069771"/>
+            <a:off x="1240975" y="3069775"/>
             <a:ext cx="353539" cy="256011"/>
           </a:xfrm>
           <a:prstGeom prst="rect">
@@ -24378,7 +24389,7 @@
         </p:nvSpPr>
         <p:spPr>
           <a:xfrm>
-            <a:off x="6744306" y="3069770"/>
+            <a:off x="6744308" y="3069769"/>
             <a:ext cx="1857143" cy="3609524"/>
           </a:xfrm>
           <a:prstGeom prst="rect">
@@ -24564,8 +24575,8 @@
         </p:nvSpPr>
         <p:spPr>
           <a:xfrm>
-            <a:off x="1117944" y="1722573"/>
-            <a:ext cx="4108812" cy="840005"/>
+            <a:off x="1117943" y="1722573"/>
+            <a:ext cx="4922129" cy="1045794"/>
           </a:xfrm>
           <a:prstGeom prst="rect">
             <a:avLst/>
@@ -24598,9 +24609,8 @@
                   <a:schemeClr val="tx1"/>
                 </a:solidFill>
               </a:rPr>
-              <a:t>set_bg_image_and_size(filepath,Shape)
-Width: 27.8377
-Height: 20.1583</a:t>
+              <a:t>set_bg_image(filepath,Shape) and do not resize
+transformations\utils\images\greenarrow.png</a:t>
             </a:r>
             <a:endParaRPr lang="en-GB" sz="1600" dirty="0">
               <a:solidFill>
@@ -24623,7 +24633,7 @@
         <p:spPr>
           <a:xfrm>
             <a:off x="1240972" y="3069771"/>
-            <a:ext cx="2484361" cy="1795740"/>
+            <a:ext cx="4799101" cy="604608"/>
           </a:xfrm>
           <a:prstGeom prst="rect">
             <a:avLst/>
@@ -24658,7 +24668,7 @@
             <a:pPr algn="ctr"/>
             <a:r>
               <a:rPr lang="en-GB"/>
-              <a:t>All Tables</a:t>
+              <a:t>greenarrow.png</a:t>
             </a:r>
             <a:endParaRPr lang="en-GB" dirty="0"/>
           </a:p>
@@ -24676,8 +24686,8 @@
         </p:nvSpPr>
         <p:spPr>
           <a:xfrm>
-            <a:off x="6621278" y="1722573"/>
-            <a:ext cx="4108812" cy="840005"/>
+            <a:off x="6621277" y="1722573"/>
+            <a:ext cx="5089753" cy="1196796"/>
           </a:xfrm>
           <a:prstGeom prst="rect">
             <a:avLst/>
@@ -24710,9 +24720,8 @@
                   <a:schemeClr val="tx1"/>
                 </a:solidFill>
               </a:rPr>
-              <a:t>set_bg_image_and_size(filepath,Shape)
-Width: 27.8377
-Height: 20.1583</a:t>
+              <a:t>set_bg_picture_center_tile(filepath,Shape) and do not resize
+transformations\utils\images\greenarrow.png</a:t>
             </a:r>
             <a:endParaRPr lang="en-GB" sz="1600" dirty="0">
               <a:solidFill>
@@ -24734,8 +24743,8 @@
         </p:nvSpPr>
         <p:spPr>
           <a:xfrm>
-            <a:off x="6744306" y="3069771"/>
-            <a:ext cx="2484361" cy="1795740"/>
+            <a:off x="6744306" y="3069770"/>
+            <a:ext cx="4773778" cy="2752189"/>
           </a:xfrm>
           <a:prstGeom prst="rect">
             <a:avLst/>
@@ -24743,7 +24752,7 @@
           <a:blipFill dpi="0" rotWithShape="1">
             <a:blip r:embed="rId6"/>
             <a:srcRect/>
-            <a:tile tx="1065411" ty="769865" sx="100000" sy="100000" flip="xy" algn="tl"/>
+            <a:tile tx="2210120" ty="1248089" sx="100000" sy="100000" flip="xy" algn="tl"/>
           </a:blipFill>
         </p:spPr>
         <p:style>
@@ -24769,7 +24778,7 @@
             <a:pPr algn="ctr"/>
             <a:r>
               <a:rPr lang="en-GB"/>
-              <a:t>All Tables</a:t>
+              <a:t>greenarrow.png</a:t>
             </a:r>
             <a:endParaRPr lang="en-GB" dirty="0"/>
           </a:p>
@@ -24861,7 +24870,7 @@
             </p:custDataLst>
             <p:extLst>
               <p:ext uri="{D42A27DB-BD31-4B8C-83A1-F6EECF244321}">
-                <p14:modId xmlns:p14="http://schemas.microsoft.com/office/powerpoint/2010/main" val="3112522167"/>
+                <p14:modId xmlns:p14="http://schemas.microsoft.com/office/powerpoint/2010/main" val="373594633"/>
               </p:ext>
             </p:extLst>
           </p:nvPr>
@@ -27084,7 +27093,7 @@
             </p:custDataLst>
             <p:extLst>
               <p:ext uri="{D42A27DB-BD31-4B8C-83A1-F6EECF244321}">
-                <p14:modId xmlns:p14="http://schemas.microsoft.com/office/powerpoint/2010/main" val="1071913813"/>
+                <p14:modId xmlns:p14="http://schemas.microsoft.com/office/powerpoint/2010/main" val="624252854"/>
               </p:ext>
             </p:extLst>
           </p:nvPr>
@@ -27230,7 +27239,7 @@
             </p:custDataLst>
             <p:extLst>
               <p:ext uri="{D42A27DB-BD31-4B8C-83A1-F6EECF244321}">
-                <p14:modId xmlns:p14="http://schemas.microsoft.com/office/powerpoint/2010/main" val="1108333282"/>
+                <p14:modId xmlns:p14="http://schemas.microsoft.com/office/powerpoint/2010/main" val="1912136656"/>
               </p:ext>
             </p:extLst>
           </p:nvPr>
@@ -27376,7 +27385,7 @@
             </p:custDataLst>
             <p:extLst>
               <p:ext uri="{D42A27DB-BD31-4B8C-83A1-F6EECF244321}">
-                <p14:modId xmlns:p14="http://schemas.microsoft.com/office/powerpoint/2010/main" val="578638292"/>
+                <p14:modId xmlns:p14="http://schemas.microsoft.com/office/powerpoint/2010/main" val="2976472588"/>
               </p:ext>
             </p:extLst>
           </p:nvPr>
@@ -27527,7 +27536,7 @@
             </p:custDataLst>
             <p:extLst>
               <p:ext uri="{D42A27DB-BD31-4B8C-83A1-F6EECF244321}">
-                <p14:modId xmlns:p14="http://schemas.microsoft.com/office/powerpoint/2010/main" val="1769368448"/>
+                <p14:modId xmlns:p14="http://schemas.microsoft.com/office/powerpoint/2010/main" val="2502187559"/>
               </p:ext>
             </p:extLst>
           </p:nvPr>
@@ -27687,7 +27696,7 @@
             </p:custDataLst>
             <p:extLst>
               <p:ext uri="{D42A27DB-BD31-4B8C-83A1-F6EECF244321}">
-                <p14:modId xmlns:p14="http://schemas.microsoft.com/office/powerpoint/2010/main" val="2228104098"/>
+                <p14:modId xmlns:p14="http://schemas.microsoft.com/office/powerpoint/2010/main" val="2289539636"/>
               </p:ext>
             </p:extLst>
           </p:nvPr>
@@ -27823,7 +27832,7 @@
             </p:custDataLst>
             <p:extLst>
               <p:ext uri="{D42A27DB-BD31-4B8C-83A1-F6EECF244321}">
-                <p14:modId xmlns:p14="http://schemas.microsoft.com/office/powerpoint/2010/main" val="2445813364"/>
+                <p14:modId xmlns:p14="http://schemas.microsoft.com/office/powerpoint/2010/main" val="1388350414"/>
               </p:ext>
             </p:extLst>
           </p:nvPr>
@@ -28026,7 +28035,7 @@
 
 <file path=ppt/tags/tag12.xml><?xml version="1.0" encoding="utf-8"?>
 <p:tagLst xmlns:a="http://schemas.openxmlformats.org/drawingml/2006/main" xmlns:r="http://schemas.openxmlformats.org/officeDocument/2006/relationships" xmlns:p="http://schemas.openxmlformats.org/presentationml/2006/main">
-  <p:tag name="HTTP://WWW.FORGETDATA.COM/SLIDES/4" val="&lt;?xml version=&quot;1.0&quot; encoding=&quot;utf-16&quot;?&gt;&lt;ShapeLink xmlns:i=&quot;http://www.w3.org/2001/XMLSchema-instance&quot; xmlns=&quot;http://www.forgetdata.com/Slides&quot;&gt;&lt;FillerProperties i:type=&quot;PowerPointTableFiller.TableFillerSettings&quot;&gt;&lt;AfterFillAction xmlns:d3p1=&quot;http://www.forgetdata.com/ReportingSuite&quot;&gt;&lt;d3p1:PackagedScript&gt;&lt;d3p1:CreatedBy&gt;ccurson&lt;/d3p1:CreatedBy&gt;&lt;d3p1:LastUpdated&gt;2016-08-09T17:10:22.716363+01:00&lt;/d3p1:LastUpdated&gt;&lt;d3p1:Script&gt;aW1wb3J0IHRhYmxlcw0KdGFibGVzLmFkZF9ncm91cF9uYW1lc190b190YWJsZV9jb2x1bW5faGVhZGVyKFRhYmxlLCBNYXRyaXgp&lt;/d3p1:Script&gt;&lt;/d3p1:PackagedScript&gt;&lt;/AfterFillAction&gt;&lt;AutoAddColumns&gt;true&lt;/AutoAddColumns&gt;&lt;AutoAddRows&gt;true&lt;/AutoAddRows&gt;&lt;AutoRemoveColumns&gt;true&lt;/AutoRemoveColumns&gt;&lt;AutoRemoveRows&gt;true&lt;/AutoRemoveRows&gt;&lt;ColumnHeadingDepth&gt;1&lt;/ColumnHeadingDepth&gt;&lt;RowHeadingDepth&gt;1&lt;/RowHeadingDepth&gt;&lt;/FillerProperties&gt;&lt;Query xmlns:d2p1=&quot;http://www.forgetdata.com/ReportingSuite&quot;&gt;&lt;d2p1:ColumnCombinationSettings /&gt;&lt;d2p1:Items&gt;&lt;d2p1:DataQueryItem&gt;&lt;d2p1:ColumnSelection&gt;/0&lt;/d2p1:ColumnSelection&gt;&lt;d2p1:ConnectionName&gt;Item0&lt;/d2p1:ConnectionName&gt;&lt;d2p1:DataQueryType&gt;SelectGroup&lt;/d2p1:DataQueryType&gt;&lt;d2p1:RowSelection&gt;/0&lt;/d2p1:RowSelection&gt;&lt;d2p1:TableName&gt;Table26&lt;/d2p1:TableName&gt;&lt;/d2p1:DataQueryItem&gt;&lt;d2p1:DataQueryItem&gt;&lt;d2p1:ColumnSelection&gt;/1[1]&lt;/d2p1:ColumnSelection&gt;&lt;d2p1:ConnectionName&gt;Item0&lt;/d2p1:ConnectionName&gt;&lt;d2p1:DataQueryType&gt;SelectColumnInGroup&lt;/d2p1:DataQueryType&gt;&lt;d2p1:RowSelection&gt;/0&lt;/d2p1:RowSelection&gt;&lt;d2p1:TableName&gt;Table26&lt;/d2p1:TableName&gt;&lt;/d2p1:DataQueryItem&gt;&lt;d2p1:DataQueryItem&gt;&lt;d2p1:ColumnSelection&gt;/1[2]&lt;/d2p1:ColumnSelection&gt;&lt;d2p1:ConnectionName&gt;Item0&lt;/d2p1:ConnectionName&gt;&lt;d2p1:DataQueryType&gt;SelectColumnInGroup&lt;/d2p1:DataQueryType&gt;&lt;d2p1:RowSelection&gt;/0&lt;/d2p1:RowSelection&gt;&lt;d2p1:TableName&gt;Table26&lt;/d2p1:TableName&gt;&lt;/d2p1:DataQueryItem&gt;&lt;/d2p1:Items&gt;&lt;d2p1:RowCombinationSettings /&gt;&lt;d2p1:Transformation&gt;&lt;d2p1:PackagedScript&gt;&lt;d2p1:CreatedBy&gt;ccurson&lt;/d2p1:CreatedBy&gt;&lt;d2p1:LastUpdated&gt;2016-08-09T17:10:22.6403682+01:00&lt;/d2p1:LastUpdated&gt;&lt;d2p1:Script&gt;aW1wb3J0IHRhYmxlcw0KdGFibGVzLmRlbGV0ZV90YWJsZV9yb3dfYmVmb3JlX2ZpbGwoKQ==&lt;/d2p1:Script&gt;&lt;/d2p1:PackagedScript&gt;&lt;/d2p1:Transformation&gt;&lt;/Query&gt;&lt;Version&gt;4.2.0.0&lt;/Version&gt;&lt;/ShapeLink&gt;"/>
+  <p:tag name="HTTP://WWW.FORGETDATA.COM/SLIDES/4" val="&lt;?xml version=&quot;1.0&quot; encoding=&quot;utf-16&quot;?&gt;&lt;ShapeLink xmlns:i=&quot;http://www.w3.org/2001/XMLSchema-instance&quot; xmlns=&quot;http://www.forgetdata.com/Slides&quot;&gt;&lt;FillerProperties i:type=&quot;PowerPointTableFiller.TableFillerSettings&quot;&gt;&lt;AfterFillAction xmlns:d3p1=&quot;http://www.forgetdata.com/ReportingSuite&quot;&gt;&lt;d3p1:PackagedScript&gt;&lt;d3p1:CreatedBy&gt;ccurson&lt;/d3p1:CreatedBy&gt;&lt;d3p1:LastUpdated&gt;2016-10-27T14:59:58.0524097+01:00&lt;/d3p1:LastUpdated&gt;&lt;d3p1:Script&gt;aW1wb3J0IHRhYmxlcw0KdGFibGVzLmFkZF9ncm91cF9uYW1lc190b190YWJsZV9jb2x1bW5faGVhZGVyKFRhYmxlLCBNYXRyaXgp&lt;/d3p1:Script&gt;&lt;/d3p1:PackagedScript&gt;&lt;/AfterFillAction&gt;&lt;AutoAddColumns&gt;true&lt;/AutoAddColumns&gt;&lt;AutoAddRows&gt;true&lt;/AutoAddRows&gt;&lt;AutoRemoveColumns&gt;true&lt;/AutoRemoveColumns&gt;&lt;AutoRemoveRows&gt;true&lt;/AutoRemoveRows&gt;&lt;ColumnHeadingDepth&gt;1&lt;/ColumnHeadingDepth&gt;&lt;RowHeadingDepth&gt;1&lt;/RowHeadingDepth&gt;&lt;/FillerProperties&gt;&lt;Query xmlns:d2p1=&quot;http://www.forgetdata.com/ReportingSuite&quot;&gt;&lt;d2p1:ColumnCombinationSettings /&gt;&lt;d2p1:Items&gt;&lt;d2p1:DataQueryItem&gt;&lt;d2p1:ColumnSelection&gt;/0&lt;/d2p1:ColumnSelection&gt;&lt;d2p1:ConnectionName&gt;Item0&lt;/d2p1:ConnectionName&gt;&lt;d2p1:DataQueryType&gt;SelectGroup&lt;/d2p1:DataQueryType&gt;&lt;d2p1:RowSelection&gt;/0&lt;/d2p1:RowSelection&gt;&lt;d2p1:TableName&gt;Table26&lt;/d2p1:TableName&gt;&lt;/d2p1:DataQueryItem&gt;&lt;d2p1:DataQueryItem&gt;&lt;d2p1:ColumnSelection&gt;/1[1]&lt;/d2p1:ColumnSelection&gt;&lt;d2p1:ConnectionName&gt;Item0&lt;/d2p1:ConnectionName&gt;&lt;d2p1:DataQueryType&gt;SelectColumnInGroup&lt;/d2p1:DataQueryType&gt;&lt;d2p1:RowSelection&gt;/0&lt;/d2p1:RowSelection&gt;&lt;d2p1:TableName&gt;Table26&lt;/d2p1:TableName&gt;&lt;/d2p1:DataQueryItem&gt;&lt;d2p1:DataQueryItem&gt;&lt;d2p1:ColumnSelection&gt;/1[2]&lt;/d2p1:ColumnSelection&gt;&lt;d2p1:ConnectionName&gt;Item0&lt;/d2p1:ConnectionName&gt;&lt;d2p1:DataQueryType&gt;SelectColumnInGroup&lt;/d2p1:DataQueryType&gt;&lt;d2p1:RowSelection&gt;/0&lt;/d2p1:RowSelection&gt;&lt;d2p1:TableName&gt;Table26&lt;/d2p1:TableName&gt;&lt;/d2p1:DataQueryItem&gt;&lt;/d2p1:Items&gt;&lt;d2p1:RowCombinationSettings /&gt;&lt;d2p1:Transformation&gt;&lt;d2p1:PackagedScript&gt;&lt;d2p1:CreatedBy&gt;ccurson&lt;/d2p1:CreatedBy&gt;&lt;d2p1:LastUpdated&gt;2016-10-27T14:59:57.9479093+01:00&lt;/d2p1:LastUpdated&gt;&lt;d2p1:Script&gt;aW1wb3J0IHRhYmxlcw0KdGFibGVzLmRlbGV0ZV90YWJsZV9yb3dfYmVmb3JlX2ZpbGwoKQ==&lt;/d2p1:Script&gt;&lt;/d2p1:PackagedScript&gt;&lt;/d2p1:Transformation&gt;&lt;/Query&gt;&lt;Version&gt;4.2.0.0&lt;/Version&gt;&lt;/ShapeLink&gt;"/>
 </p:tagLst>
 </file>
 
@@ -28050,13 +28059,13 @@
 
 <file path=ppt/tags/tag16.xml><?xml version="1.0" encoding="utf-8"?>
 <p:tagLst xmlns:a="http://schemas.openxmlformats.org/drawingml/2006/main" xmlns:r="http://schemas.openxmlformats.org/officeDocument/2006/relationships" xmlns:p="http://schemas.openxmlformats.org/presentationml/2006/main">
-  <p:tag name="HTTP://WWW.FORGETDATA.COM/SLIDES/4" val="&lt;?xml version=&quot;1.0&quot; encoding=&quot;utf-16&quot;?&gt;&lt;ShapeLink xmlns:i=&quot;http://www.w3.org/2001/XMLSchema-instance&quot; xmlns=&quot;http://www.forgetdata.com/Slides&quot;&gt;&lt;FillerProperties i:type=&quot;GenericTableInformationFiller.TableInfoFillerSettings&quot;&gt;&lt;AfterFillAction xmlns:d3p1=&quot;http://www.forgetdata.com/ReportingSuite&quot;&gt;&lt;d3p1:PackagedScript&gt;&lt;d3p1:CreatedBy&gt;ccurson&lt;/d3p1:CreatedBy&gt;&lt;d3p1:LastUpdated&gt;2016-02-16T14:34:29.7334802+00:00&lt;/d3p1:LastUpdated&gt;&lt;d3p1:Script&gt;aW1wb3J0IHRleHRzDQpyZWxvYWQodGV4dHMpDQpfaW1hZ2VfZmlsZV9wYXRoPSJ0cmFuc2Zvcm1hdGlvbnNcXHV0aWxzXFxpbWFnZXNcXGdyZWVuYXJyb3cucG5nIg0KDQpzaXplID0gdGV4dHMuZ2V0X3BwdF9pbWFnZV9zaXplKF9pbWFnZV9maWxlX3BhdGgsIFNoYXBlKQ0KDQpTaGFwZS5UZXh0RnJhbWUuVGV4dFJhbmdlLlRleHQgPSAic2V0X2JnX2ltYWdlX2FuZF9zaXplKGZpbGVwYXRoLFNoYXBlKVxuV2lkdGg6ICIgKyBzdHIoc2l6ZS5XaWR0aCkgKyAiXG5IZWlnaHQ6ICIgKyBzdHIoc2l6ZS5IZWlnaHQpDQoNCg0KDQo=&lt;/d3p1:Script&gt;&lt;/d3p1:PackagedScript&gt;&lt;/AfterFillAction&gt;&lt;TextType&gt;TableDescription&lt;/TextType&gt;&lt;/FillerProperties&gt;&lt;Query xmlns:d2p1=&quot;http://www.forgetdata.com/ReportingSuite&quot;&gt;&lt;d2p1:ColumnCombinationSettings /&gt;&lt;d2p1:Items&gt;&lt;d2p1:DataQueryItem&gt;&lt;d2p1:ColumnSelection&gt;/0[1]&lt;/d2p1:ColumnSelection&gt;&lt;d2p1:ConnectionName&gt;Item0&lt;/d2p1:ConnectionName&gt;&lt;d2p1:DataQueryType&gt;SelectCell&lt;/d2p1:DataQueryType&gt;&lt;d2p1:RowSelection&gt;/0[1]&lt;/d2p1:RowSelection&gt;&lt;d2p1:TableName&gt;Table26&lt;/d2p1:TableName&gt;&lt;/d2p1:DataQueryItem&gt;&lt;/d2p1:Items&gt;&lt;d2p1:RowCombinationSettings /&gt;&lt;/Query&gt;&lt;Version&gt;4.2.0.0&lt;/Version&gt;&lt;/ShapeLink&gt;"/>
+  <p:tag name="HTTP://WWW.FORGETDATA.COM/SLIDES/4" val="&lt;?xml version=&quot;1.0&quot; encoding=&quot;utf-16&quot;?&gt;&lt;ShapeLink xmlns:i=&quot;http://www.w3.org/2001/XMLSchema-instance&quot; xmlns=&quot;http://www.forgetdata.com/Slides&quot;&gt;&lt;FillerProperties i:type=&quot;GenericTableInformationFiller.TableInfoFillerSettings&quot;&gt;&lt;AfterFillAction xmlns:d3p1=&quot;http://www.forgetdata.com/ReportingSuite&quot;&gt;&lt;d3p1:PackagedScript&gt;&lt;d3p1:CreatedBy&gt;ccurson&lt;/d3p1:CreatedBy&gt;&lt;d3p1:LastUpdated&gt;2016-10-27T14:39:08.7162825+01:00&lt;/d3p1:LastUpdated&gt;&lt;d3p1:Script&gt;aW1wb3J0IHRleHRzDQpfaW1hZ2VfZmlsZV9wYXRoPSJ0cmFuc2Zvcm1hdGlvbnNcXHV0aWxzXFxpbWFnZXNcXGdyZWVuYXJyb3cucG5nIg0KDQpzaXplID0gdGV4dHMuX2dldF9wcHRfaW1hZ2Vfc2l6ZShfaW1hZ2VfZmlsZV9wYXRoLCBTaGFwZSkNCg0KU2hhcGUuVGV4dEZyYW1lLlRleHRSYW5nZS5UZXh0ID0gInNldF9iZ19pbWFnZV9hbmRfc2l6ZShmaWxlcGF0aCxTaGFwZSlcbldpZHRoOiAiICsgc3RyKHNpemUuV2lkdGgpICsgIlxuSGVpZ2h0OiAiICsgc3RyKHNpemUuSGVpZ2h0KQ0KDQoNCg0K&lt;/d3p1:Script&gt;&lt;/d3p1:PackagedScript&gt;&lt;/AfterFillAction&gt;&lt;TextType&gt;TableDescription&lt;/TextType&gt;&lt;/FillerProperties&gt;&lt;Query xmlns:d2p1=&quot;http://www.forgetdata.com/ReportingSuite&quot;&gt;&lt;d2p1:ColumnCombinationSettings /&gt;&lt;d2p1:Items&gt;&lt;d2p1:DataQueryItem&gt;&lt;d2p1:ColumnSelection&gt;/0[1]&lt;/d2p1:ColumnSelection&gt;&lt;d2p1:ConnectionName&gt;Item0&lt;/d2p1:ConnectionName&gt;&lt;d2p1:DataQueryType&gt;SelectCell&lt;/d2p1:DataQueryType&gt;&lt;d2p1:RowSelection&gt;/0[1]&lt;/d2p1:RowSelection&gt;&lt;d2p1:TableName&gt;Table26&lt;/d2p1:TableName&gt;&lt;/d2p1:DataQueryItem&gt;&lt;/d2p1:Items&gt;&lt;d2p1:RowCombinationSettings /&gt;&lt;/Query&gt;&lt;Version&gt;4.2.0.0&lt;/Version&gt;&lt;/ShapeLink&gt;"/>
 </p:tagLst>
 </file>
 
 <file path=ppt/tags/tag17.xml><?xml version="1.0" encoding="utf-8"?>
 <p:tagLst xmlns:a="http://schemas.openxmlformats.org/drawingml/2006/main" xmlns:r="http://schemas.openxmlformats.org/officeDocument/2006/relationships" xmlns:p="http://schemas.openxmlformats.org/presentationml/2006/main">
-  <p:tag name="HTTP://WWW.FORGETDATA.COM/SLIDES/4" val="&lt;?xml version=&quot;1.0&quot; encoding=&quot;utf-16&quot;?&gt;&lt;ShapeLink xmlns:i=&quot;http://www.w3.org/2001/XMLSchema-instance&quot; xmlns=&quot;http://www.forgetdata.com/Slides&quot;&gt;&lt;FillerProperties i:type=&quot;GenericTableInformationFiller.TableInfoFillerSettings&quot;&gt;&lt;AfterFillAction xmlns:d3p1=&quot;http://www.forgetdata.com/ReportingSuite&quot;&gt;&lt;d3p1:PackagedScript&gt;&lt;d3p1:CreatedBy&gt;ccurson&lt;/d3p1:CreatedBy&gt;&lt;d3p1:LastUpdated&gt;2016-02-16T14:42:01.2600368+00:00&lt;/d3p1:LastUpdated&gt;&lt;d3p1:Script&gt;aW1wb3J0IHRleHRzDQpfaW1hZ2VfZmlsZV9wYXRoPSJ0cmFuc2Zvcm1hdGlvbnNcXHV0aWxzXFxpbWFnZXNcXGdyZWVuYXJyb3cucG5nIg0KdGV4dHMuc2V0X2JnX2ltYWdlX2FuZF9zaXplKF9pbWFnZV9maWxlX3BhdGgsIFNoYXBlKQ==&lt;/d3p1:Script&gt;&lt;/d3p1:PackagedScript&gt;&lt;/AfterFillAction&gt;&lt;TextType&gt;TableDescription&lt;/TextType&gt;&lt;/FillerProperties&gt;&lt;Query xmlns:d2p1=&quot;http://www.forgetdata.com/ReportingSuite&quot;&gt;&lt;d2p1:ColumnCombinationSettings /&gt;&lt;d2p1:Items&gt;&lt;d2p1:DataQueryItem&gt;&lt;d2p1:ColumnSelection&gt;/0[1]&lt;/d2p1:ColumnSelection&gt;&lt;d2p1:ConnectionName&gt;Item0&lt;/d2p1:ConnectionName&gt;&lt;d2p1:DataQueryType&gt;SelectCell&lt;/d2p1:DataQueryType&gt;&lt;d2p1:RowSelection&gt;/0[1]&lt;/d2p1:RowSelection&gt;&lt;d2p1:TableName&gt;Table26&lt;/d2p1:TableName&gt;&lt;/d2p1:DataQueryItem&gt;&lt;/d2p1:Items&gt;&lt;d2p1:RowCombinationSettings /&gt;&lt;/Query&gt;&lt;Version&gt;4.2.0.0&lt;/Version&gt;&lt;/ShapeLink&gt;"/>
+  <p:tag name="HTTP://WWW.FORGETDATA.COM/SLIDES/4" val="&lt;?xml version=&quot;1.0&quot; encoding=&quot;utf-16&quot;?&gt;&lt;ShapeLink xmlns:i=&quot;http://www.w3.org/2001/XMLSchema-instance&quot; xmlns=&quot;http://www.forgetdata.com/Slides&quot;&gt;&lt;FillerProperties i:type=&quot;GenericTableInformationFiller.TableInfoFillerSettings&quot;&gt;&lt;AfterFillAction xmlns:d3p1=&quot;http://www.forgetdata.com/ReportingSuite&quot;&gt;&lt;d3p1:PackagedScript&gt;&lt;d3p1:CreatedBy&gt;ccurson&lt;/d3p1:CreatedBy&gt;&lt;d3p1:LastUpdated&gt;2016-10-27T14:38:55.4856141+01:00&lt;/d3p1:LastUpdated&gt;&lt;d3p1:Script&gt;aW1wb3J0IHRleHRzDQpfaW1hZ2VfZmlsZV9wYXRoPSJ0cmFuc2Zvcm1hdGlvbnNcXHV0aWxzXFxpbWFnZXNcXGdyZWVuYXJyb3cucG5nIg0KdGV4dHMuc2V0X2JnX2ltYWdlX2FuZF9zaXplKF9pbWFnZV9maWxlX3BhdGgsIFNoYXBlKQ==&lt;/d3p1:Script&gt;&lt;/d3p1:PackagedScript&gt;&lt;/AfterFillAction&gt;&lt;TextType&gt;TableDescription&lt;/TextType&gt;&lt;/FillerProperties&gt;&lt;Query xmlns:d2p1=&quot;http://www.forgetdata.com/ReportingSuite&quot;&gt;&lt;d2p1:ColumnCombinationSettings /&gt;&lt;d2p1:Items&gt;&lt;d2p1:DataQueryItem&gt;&lt;d2p1:ColumnSelection&gt;/0[1]&lt;/d2p1:ColumnSelection&gt;&lt;d2p1:ConnectionName&gt;Item0&lt;/d2p1:ConnectionName&gt;&lt;d2p1:DataQueryType&gt;SelectCell&lt;/d2p1:DataQueryType&gt;&lt;d2p1:RowSelection&gt;/0[1]&lt;/d2p1:RowSelection&gt;&lt;d2p1:TableName&gt;Table26&lt;/d2p1:TableName&gt;&lt;/d2p1:DataQueryItem&gt;&lt;/d2p1:Items&gt;&lt;d2p1:RowCombinationSettings /&gt;&lt;/Query&gt;&lt;Version&gt;4.2.0.0&lt;/Version&gt;&lt;/ShapeLink&gt;"/>
 </p:tagLst>
 </file>
 
@@ -28068,7 +28077,7 @@
 
 <file path=ppt/tags/tag19.xml><?xml version="1.0" encoding="utf-8"?>
 <p:tagLst xmlns:a="http://schemas.openxmlformats.org/drawingml/2006/main" xmlns:r="http://schemas.openxmlformats.org/officeDocument/2006/relationships" xmlns:p="http://schemas.openxmlformats.org/presentationml/2006/main">
-  <p:tag name="HTTP://WWW.FORGETDATA.COM/SLIDES/4" val="&lt;?xml version=&quot;1.0&quot; encoding=&quot;utf-16&quot;?&gt;&lt;ShapeLink xmlns:i=&quot;http://www.w3.org/2001/XMLSchema-instance&quot; xmlns=&quot;http://www.forgetdata.com/Slides&quot;&gt;&lt;FillerProperties i:type=&quot;GenericTableInformationFiller.TableInfoFillerSettings&quot;&gt;&lt;AfterFillAction xmlns:d3p1=&quot;http://www.forgetdata.com/ReportingSuite&quot;&gt;&lt;d3p1:PackagedScript&gt;&lt;d3p1:CreatedBy&gt;ccurson&lt;/d3p1:CreatedBy&gt;&lt;d3p1:LastUpdated&gt;2016-02-16T14:35:17.9653219+00:00&lt;/d3p1:LastUpdated&gt;&lt;d3p1:Script&gt;aW1wb3J0IHRleHRzDQpyZWxvYWQodGV4dHMpDQpfaW1hZ2VfZmlsZV9wYXRoPSJ0cmFuc2Zvcm1hdGlvbnNcXHV0aWxzXFxpbWFnZXNcXHRlc3RpbmdzaXplLnBuZyINCg0Kc2l6ZSA9IHRleHRzLmdldF9wcHRfaW1hZ2Vfc2l6ZShfaW1hZ2VfZmlsZV9wYXRoLCBTaGFwZSkNCg0KU2hhcGUuVGV4dEZyYW1lLlRleHRSYW5nZS5UZXh0ID0gInNldF9iZ19pbWFnZV9hbmRfc2l6ZShmaWxlcGF0aCxTaGFwZSlcbldpZHRoOiAiICsgc3RyKHNpemUuV2lkdGgpICsgIlxuSGVpZ2h0OiAiICsgc3RyKHNpemUuSGVpZ2h0KQ0KDQoNCg0K&lt;/d3p1:Script&gt;&lt;/d3p1:PackagedScript&gt;&lt;/AfterFillAction&gt;&lt;TextType&gt;TableDescription&lt;/TextType&gt;&lt;/FillerProperties&gt;&lt;Query xmlns:d2p1=&quot;http://www.forgetdata.com/ReportingSuite&quot;&gt;&lt;d2p1:ColumnCombinationSettings /&gt;&lt;d2p1:Items&gt;&lt;d2p1:DataQueryItem&gt;&lt;d2p1:ColumnSelection&gt;/0[1]&lt;/d2p1:ColumnSelection&gt;&lt;d2p1:ConnectionName&gt;Item0&lt;/d2p1:ConnectionName&gt;&lt;d2p1:DataQueryType&gt;SelectCell&lt;/d2p1:DataQueryType&gt;&lt;d2p1:RowSelection&gt;/0[1]&lt;/d2p1:RowSelection&gt;&lt;d2p1:TableName&gt;Table26&lt;/d2p1:TableName&gt;&lt;/d2p1:DataQueryItem&gt;&lt;/d2p1:Items&gt;&lt;d2p1:RowCombinationSettings /&gt;&lt;/Query&gt;&lt;Version&gt;4.2.0.0&lt;/Version&gt;&lt;/ShapeLink&gt;"/>
+  <p:tag name="HTTP://WWW.FORGETDATA.COM/SLIDES/4" val="&lt;?xml version=&quot;1.0&quot; encoding=&quot;utf-16&quot;?&gt;&lt;ShapeLink xmlns:i=&quot;http://www.w3.org/2001/XMLSchema-instance&quot; xmlns=&quot;http://www.forgetdata.com/Slides&quot;&gt;&lt;FillerProperties i:type=&quot;GenericTableInformationFiller.TableInfoFillerSettings&quot;&gt;&lt;AfterFillAction xmlns:d3p1=&quot;http://www.forgetdata.com/ReportingSuite&quot;&gt;&lt;d3p1:PackagedScript&gt;&lt;d3p1:CreatedBy&gt;ccurson&lt;/d3p1:CreatedBy&gt;&lt;d3p1:LastUpdated&gt;2016-10-27T14:39:37.5621373+01:00&lt;/d3p1:LastUpdated&gt;&lt;d3p1:Script&gt;aW1wb3J0IHRleHRzDQpfaW1hZ2VfZmlsZV9wYXRoPSJ0cmFuc2Zvcm1hdGlvbnNcXHV0aWxzXFxpbWFnZXNcXHRlc3RpbmdzaXplLnBuZyINCg0Kc2l6ZSA9IHRleHRzLl9nZXRfcHB0X2ltYWdlX3NpemUoX2ltYWdlX2ZpbGVfcGF0aCwgU2hhcGUpDQoNClNoYXBlLlRleHRGcmFtZS5UZXh0UmFuZ2UuVGV4dCA9ICJzZXRfYmdfaW1hZ2VfYW5kX3NpemUoZmlsZXBhdGgsU2hhcGUpXG5XaWR0aDogIiArIHN0cihzaXplLldpZHRoKSArICJcbkhlaWdodDogIiArIHN0cihzaXplLkhlaWdodCkNCg0KDQoNCg==&lt;/d3p1:Script&gt;&lt;/d3p1:PackagedScript&gt;&lt;/AfterFillAction&gt;&lt;TextType&gt;TableDescription&lt;/TextType&gt;&lt;/FillerProperties&gt;&lt;Query xmlns:d2p1=&quot;http://www.forgetdata.com/ReportingSuite&quot;&gt;&lt;d2p1:ColumnCombinationSettings /&gt;&lt;d2p1:Items&gt;&lt;d2p1:DataQueryItem&gt;&lt;d2p1:ColumnSelection&gt;/0[1]&lt;/d2p1:ColumnSelection&gt;&lt;d2p1:ConnectionName&gt;Item0&lt;/d2p1:ConnectionName&gt;&lt;d2p1:DataQueryType&gt;SelectCell&lt;/d2p1:DataQueryType&gt;&lt;d2p1:RowSelection&gt;/0[1]&lt;/d2p1:RowSelection&gt;&lt;d2p1:TableName&gt;Table26&lt;/d2p1:TableName&gt;&lt;/d2p1:DataQueryItem&gt;&lt;/d2p1:Items&gt;&lt;d2p1:RowCombinationSettings /&gt;&lt;/Query&gt;&lt;Version&gt;4.2.0.0&lt;/Version&gt;&lt;/ShapeLink&gt;"/>
 </p:tagLst>
 </file>
 
@@ -28080,25 +28089,25 @@
 
 <file path=ppt/tags/tag20.xml><?xml version="1.0" encoding="utf-8"?>
 <p:tagLst xmlns:a="http://schemas.openxmlformats.org/drawingml/2006/main" xmlns:r="http://schemas.openxmlformats.org/officeDocument/2006/relationships" xmlns:p="http://schemas.openxmlformats.org/presentationml/2006/main">
-  <p:tag name="HTTP://WWW.FORGETDATA.COM/SLIDES/4" val="&lt;?xml version=&quot;1.0&quot; encoding=&quot;utf-16&quot;?&gt;&lt;ShapeLink xmlns:i=&quot;http://www.w3.org/2001/XMLSchema-instance&quot; xmlns=&quot;http://www.forgetdata.com/Slides&quot;&gt;&lt;FillerProperties i:type=&quot;GenericTableInformationFiller.TableInfoFillerSettings&quot;&gt;&lt;AfterFillAction xmlns:d3p1=&quot;http://www.forgetdata.com/ReportingSuite&quot;&gt;&lt;d3p1:PackagedScript&gt;&lt;d3p1:CreatedBy&gt;ccurson&lt;/d3p1:CreatedBy&gt;&lt;d3p1:LastUpdated&gt;2016-02-16T14:34:29.7334802+00:00&lt;/d3p1:LastUpdated&gt;&lt;d3p1:Script&gt;aW1wb3J0IHRleHRzDQpyZWxvYWQodGV4dHMpDQpfaW1hZ2VfZmlsZV9wYXRoPSJ0cmFuc2Zvcm1hdGlvbnNcXHV0aWxzXFxpbWFnZXNcXGdyZWVuYXJyb3cucG5nIg0KDQpzaXplID0gdGV4dHMuZ2V0X3BwdF9pbWFnZV9zaXplKF9pbWFnZV9maWxlX3BhdGgsIFNoYXBlKQ0KDQpTaGFwZS5UZXh0RnJhbWUuVGV4dFJhbmdlLlRleHQgPSAic2V0X2JnX2ltYWdlX2FuZF9zaXplKGZpbGVwYXRoLFNoYXBlKVxuV2lkdGg6ICIgKyBzdHIoc2l6ZS5XaWR0aCkgKyAiXG5IZWlnaHQ6ICIgKyBzdHIoc2l6ZS5IZWlnaHQpDQoNCg0KDQo=&lt;/d3p1:Script&gt;&lt;/d3p1:PackagedScript&gt;&lt;/AfterFillAction&gt;&lt;TextType&gt;TableDescription&lt;/TextType&gt;&lt;/FillerProperties&gt;&lt;Query xmlns:d2p1=&quot;http://www.forgetdata.com/ReportingSuite&quot;&gt;&lt;d2p1:ColumnCombinationSettings /&gt;&lt;d2p1:Items&gt;&lt;d2p1:DataQueryItem&gt;&lt;d2p1:ColumnSelection&gt;/0[1]&lt;/d2p1:ColumnSelection&gt;&lt;d2p1:ConnectionName&gt;Item0&lt;/d2p1:ConnectionName&gt;&lt;d2p1:DataQueryType&gt;SelectCell&lt;/d2p1:DataQueryType&gt;&lt;d2p1:RowSelection&gt;/0[1]&lt;/d2p1:RowSelection&gt;&lt;d2p1:TableName&gt;Table26&lt;/d2p1:TableName&gt;&lt;/d2p1:DataQueryItem&gt;&lt;/d2p1:Items&gt;&lt;d2p1:RowCombinationSettings /&gt;&lt;/Query&gt;&lt;Version&gt;4.2.0.0&lt;/Version&gt;&lt;/ShapeLink&gt;"/>
+  <p:tag name="HTTP://WWW.FORGETDATA.COM/SLIDES/4" val="&lt;?xml version=&quot;1.0&quot; encoding=&quot;utf-16&quot;?&gt;&lt;ShapeLink xmlns:i=&quot;http://www.w3.org/2001/XMLSchema-instance&quot; xmlns=&quot;http://www.forgetdata.com/Slides&quot;&gt;&lt;FillerProperties i:type=&quot;GenericTableInformationFiller.TableInfoFillerSettings&quot;&gt;&lt;AfterFillAction xmlns:d3p1=&quot;http://www.forgetdata.com/ReportingSuite&quot;&gt;&lt;d3p1:PackagedScript&gt;&lt;d3p1:CreatedBy&gt;ccurson&lt;/d3p1:CreatedBy&gt;&lt;d3p1:LastUpdated&gt;2016-10-27T14:47:24.3860073+01:00&lt;/d3p1:LastUpdated&gt;&lt;d3p1:Script&gt;aW1wb3J0IHRleHRzDQoNCl9pbWFnZV9maWxlX3BhdGg9InRyYW5zZm9ybWF0aW9uc1xcdXRpbHNcXGltYWdlc1xcZ3JlZW5hcnJvdy5wbmciDQoNCnNpemUgPSB0ZXh0cy5fZ2V0X3BwdF9pbWFnZV9zaXplKF9pbWFnZV9maWxlX3BhdGgsIFNoYXBlKQ0KDQpTaGFwZS5UZXh0RnJhbWUuVGV4dFJhbmdlLlRleHQgPSAic2V0X2JnX2ltYWdlKGZpbGVwYXRoLFNoYXBlKSBhbmQgZG8gbm90IHJlc2l6ZVxuIiArIF9pbWFnZV9maWxlX3BhdGgNCg0KDQoNCg==&lt;/d3p1:Script&gt;&lt;/d3p1:PackagedScript&gt;&lt;/AfterFillAction&gt;&lt;TextType&gt;TableDescription&lt;/TextType&gt;&lt;/FillerProperties&gt;&lt;Query xmlns:d2p1=&quot;http://www.forgetdata.com/ReportingSuite&quot;&gt;&lt;d2p1:ColumnCombinationSettings /&gt;&lt;d2p1:Items&gt;&lt;d2p1:DataQueryItem&gt;&lt;d2p1:ColumnSelection&gt;/0[1]&lt;/d2p1:ColumnSelection&gt;&lt;d2p1:ConnectionName&gt;Item0&lt;/d2p1:ConnectionName&gt;&lt;d2p1:DataQueryType&gt;SelectCell&lt;/d2p1:DataQueryType&gt;&lt;d2p1:RowSelection&gt;/0[1]&lt;/d2p1:RowSelection&gt;&lt;d2p1:TableName&gt;Table26&lt;/d2p1:TableName&gt;&lt;/d2p1:DataQueryItem&gt;&lt;/d2p1:Items&gt;&lt;d2p1:RowCombinationSettings /&gt;&lt;/Query&gt;&lt;Version&gt;4.2.0.0&lt;/Version&gt;&lt;/ShapeLink&gt;"/>
 </p:tagLst>
 </file>
 
 <file path=ppt/tags/tag21.xml><?xml version="1.0" encoding="utf-8"?>
 <p:tagLst xmlns:a="http://schemas.openxmlformats.org/drawingml/2006/main" xmlns:r="http://schemas.openxmlformats.org/officeDocument/2006/relationships" xmlns:p="http://schemas.openxmlformats.org/presentationml/2006/main">
-  <p:tag name="HTTP://WWW.FORGETDATA.COM/SLIDES/4" val="&lt;?xml version=&quot;1.0&quot; encoding=&quot;utf-16&quot;?&gt;&lt;ShapeLink xmlns:i=&quot;http://www.w3.org/2001/XMLSchema-instance&quot; xmlns=&quot;http://www.forgetdata.com/Slides&quot;&gt;&lt;FillerProperties i:type=&quot;GenericTableInformationFiller.TableInfoFillerSettings&quot;&gt;&lt;AfterFillAction xmlns:d3p1=&quot;http://www.forgetdata.com/ReportingSuite&quot;&gt;&lt;d3p1:PackagedScript&gt;&lt;d3p1:CreatedBy&gt;ccurson&lt;/d3p1:CreatedBy&gt;&lt;d3p1:LastUpdated&gt;2016-02-16T14:41:44.8625471+00:00&lt;/d3p1:LastUpdated&gt;&lt;d3p1:Script&gt;aW1wb3J0IHRleHRzDQpfaW1hZ2VfZmlsZV9wYXRoPSJ0cmFuc2Zvcm1hdGlvbnNcXHV0aWxzXFxpbWFnZXNcXGdyZWVuYXJyb3cucG5nIg0KdGV4dHMuc2V0X2JnX2ltYWdlKF9pbWFnZV9maWxlX3BhdGgsIFNoYXBlKQ==&lt;/d3p1:Script&gt;&lt;/d3p1:PackagedScript&gt;&lt;/AfterFillAction&gt;&lt;TextType&gt;TableDescription&lt;/TextType&gt;&lt;/FillerProperties&gt;&lt;Query xmlns:d2p1=&quot;http://www.forgetdata.com/ReportingSuite&quot;&gt;&lt;d2p1:ColumnCombinationSettings /&gt;&lt;d2p1:Items&gt;&lt;d2p1:DataQueryItem&gt;&lt;d2p1:ColumnSelection&gt;/0[1]&lt;/d2p1:ColumnSelection&gt;&lt;d2p1:ConnectionName&gt;Item0&lt;/d2p1:ConnectionName&gt;&lt;d2p1:DataQueryType&gt;SelectCell&lt;/d2p1:DataQueryType&gt;&lt;d2p1:RowSelection&gt;/0[1]&lt;/d2p1:RowSelection&gt;&lt;d2p1:TableName&gt;Table26&lt;/d2p1:TableName&gt;&lt;/d2p1:DataQueryItem&gt;&lt;/d2p1:Items&gt;&lt;d2p1:RowCombinationSettings /&gt;&lt;/Query&gt;&lt;Version&gt;4.2.0.0&lt;/Version&gt;&lt;/ShapeLink&gt;"/>
+  <p:tag name="HTTP://WWW.FORGETDATA.COM/SLIDES/4" val="&lt;?xml version=&quot;1.0&quot; encoding=&quot;utf-16&quot;?&gt;&lt;ShapeLink xmlns:i=&quot;http://www.w3.org/2001/XMLSchema-instance&quot; xmlns=&quot;http://www.forgetdata.com/Slides&quot;&gt;&lt;FillerProperties i:type=&quot;GenericTableInformationFiller.TableInfoFillerSettings&quot;&gt;&lt;AfterFillAction xmlns:d3p1=&quot;http://www.forgetdata.com/ReportingSuite&quot;&gt;&lt;d3p1:PackagedScript&gt;&lt;d3p1:CreatedBy&gt;ccurson&lt;/d3p1:CreatedBy&gt;&lt;d3p1:LastUpdated&gt;2016-10-27T14:44:55.1385794+01:00&lt;/d3p1:LastUpdated&gt;&lt;d3p1:Script&gt;aW1wb3J0IHRleHRzDQpfaW1hZ2VfZmlsZV9wYXRoPSJ0cmFuc2Zvcm1hdGlvbnNcXHV0aWxzXFxpbWFnZXNcXGdyZWVuYXJyb3cucG5nIg0KdGV4dHMuc2V0X2JnX2ltYWdlKF9pbWFnZV9maWxlX3BhdGgsIFNoYXBlKQ==&lt;/d3p1:Script&gt;&lt;/d3p1:PackagedScript&gt;&lt;/AfterFillAction&gt;&lt;TextType&gt;TableDescription&lt;/TextType&gt;&lt;/FillerProperties&gt;&lt;Query xmlns:d2p1=&quot;http://www.forgetdata.com/ReportingSuite&quot;&gt;&lt;d2p1:ColumnCombinationSettings /&gt;&lt;d2p1:Items&gt;&lt;d2p1:DataQueryItem&gt;&lt;d2p1:ColumnSelection&gt;/0[1]&lt;/d2p1:ColumnSelection&gt;&lt;d2p1:ConnectionName&gt;Item0&lt;/d2p1:ConnectionName&gt;&lt;d2p1:DataQueryType&gt;SelectCell&lt;/d2p1:DataQueryType&gt;&lt;d2p1:RowSelection&gt;/0[1]&lt;/d2p1:RowSelection&gt;&lt;d2p1:TableName&gt;Table26&lt;/d2p1:TableName&gt;&lt;/d2p1:DataQueryItem&gt;&lt;/d2p1:Items&gt;&lt;d2p1:RowCombinationSettings /&gt;&lt;d2p1:Transformation&gt;&lt;d2p1:PackagedScript&gt;&lt;d2p1:CreatedBy&gt;ccurson&lt;/d2p1:CreatedBy&gt;&lt;d2p1:LastUpdated&gt;2016-10-27T14:44:55.0534381+01:00&lt;/d2p1:LastUpdated&gt;&lt;d2p1:Script&gt;TWF0cml4LkxhYmVsID0gImdyZWVuYXJyb3cucG5nIg==&lt;/d2p1:Script&gt;&lt;/d2p1:PackagedScript&gt;&lt;/d2p1:Transformation&gt;&lt;/Query&gt;&lt;Version&gt;4.2.0.0&lt;/Version&gt;&lt;/ShapeLink&gt;"/>
 </p:tagLst>
 </file>
 
 <file path=ppt/tags/tag22.xml><?xml version="1.0" encoding="utf-8"?>
 <p:tagLst xmlns:a="http://schemas.openxmlformats.org/drawingml/2006/main" xmlns:r="http://schemas.openxmlformats.org/officeDocument/2006/relationships" xmlns:p="http://schemas.openxmlformats.org/presentationml/2006/main">
-  <p:tag name="HTTP://WWW.FORGETDATA.COM/SLIDES/4" val="&lt;?xml version=&quot;1.0&quot; encoding=&quot;utf-16&quot;?&gt;&lt;ShapeLink xmlns:i=&quot;http://www.w3.org/2001/XMLSchema-instance&quot; xmlns=&quot;http://www.forgetdata.com/Slides&quot;&gt;&lt;FillerProperties i:type=&quot;GenericTableInformationFiller.TableInfoFillerSettings&quot;&gt;&lt;AfterFillAction xmlns:d3p1=&quot;http://www.forgetdata.com/ReportingSuite&quot;&gt;&lt;d3p1:PackagedScript&gt;&lt;d3p1:CreatedBy&gt;ccurson&lt;/d3p1:CreatedBy&gt;&lt;d3p1:LastUpdated&gt;2016-02-16T14:34:29.7334802+00:00&lt;/d3p1:LastUpdated&gt;&lt;d3p1:Script&gt;aW1wb3J0IHRleHRzDQpyZWxvYWQodGV4dHMpDQpfaW1hZ2VfZmlsZV9wYXRoPSJ0cmFuc2Zvcm1hdGlvbnNcXHV0aWxzXFxpbWFnZXNcXGdyZWVuYXJyb3cucG5nIg0KDQpzaXplID0gdGV4dHMuZ2V0X3BwdF9pbWFnZV9zaXplKF9pbWFnZV9maWxlX3BhdGgsIFNoYXBlKQ0KDQpTaGFwZS5UZXh0RnJhbWUuVGV4dFJhbmdlLlRleHQgPSAic2V0X2JnX2ltYWdlX2FuZF9zaXplKGZpbGVwYXRoLFNoYXBlKVxuV2lkdGg6ICIgKyBzdHIoc2l6ZS5XaWR0aCkgKyAiXG5IZWlnaHQ6ICIgKyBzdHIoc2l6ZS5IZWlnaHQpDQoNCg0KDQo=&lt;/d3p1:Script&gt;&lt;/d3p1:PackagedScript&gt;&lt;/AfterFillAction&gt;&lt;TextType&gt;TableDescription&lt;/TextType&gt;&lt;/FillerProperties&gt;&lt;Query xmlns:d2p1=&quot;http://www.forgetdata.com/ReportingSuite&quot;&gt;&lt;d2p1:ColumnCombinationSettings /&gt;&lt;d2p1:Items&gt;&lt;d2p1:DataQueryItem&gt;&lt;d2p1:ColumnSelection&gt;/0[1]&lt;/d2p1:ColumnSelection&gt;&lt;d2p1:ConnectionName&gt;Item0&lt;/d2p1:ConnectionName&gt;&lt;d2p1:DataQueryType&gt;SelectCell&lt;/d2p1:DataQueryType&gt;&lt;d2p1:RowSelection&gt;/0[1]&lt;/d2p1:RowSelection&gt;&lt;d2p1:TableName&gt;Table26&lt;/d2p1:TableName&gt;&lt;/d2p1:DataQueryItem&gt;&lt;/d2p1:Items&gt;&lt;d2p1:RowCombinationSettings /&gt;&lt;/Query&gt;&lt;Version&gt;4.2.0.0&lt;/Version&gt;&lt;/ShapeLink&gt;"/>
+  <p:tag name="HTTP://WWW.FORGETDATA.COM/SLIDES/4" val="&lt;?xml version=&quot;1.0&quot; encoding=&quot;utf-16&quot;?&gt;&lt;ShapeLink xmlns:i=&quot;http://www.w3.org/2001/XMLSchema-instance&quot; xmlns=&quot;http://www.forgetdata.com/Slides&quot;&gt;&lt;FillerProperties i:type=&quot;GenericTableInformationFiller.TableInfoFillerSettings&quot;&gt;&lt;AfterFillAction xmlns:d3p1=&quot;http://www.forgetdata.com/ReportingSuite&quot;&gt;&lt;d3p1:PackagedScript&gt;&lt;d3p1:CreatedBy&gt;ccurson&lt;/d3p1:CreatedBy&gt;&lt;d3p1:LastUpdated&gt;2016-10-27T14:47:49.7840066+01:00&lt;/d3p1:LastUpdated&gt;&lt;d3p1:Script&gt;aW1wb3J0IHRleHRzDQoNCl9pbWFnZV9maWxlX3BhdGg9InRyYW5zZm9ybWF0aW9uc1xcdXRpbHNcXGltYWdlc1xcZ3JlZW5hcnJvdy5wbmciDQoNCnNpemUgPSB0ZXh0cy5fZ2V0X3BwdF9pbWFnZV9zaXplKF9pbWFnZV9maWxlX3BhdGgsIFNoYXBlKQ0KDQpTaGFwZS5UZXh0RnJhbWUuVGV4dFJhbmdlLlRleHQgPSAic2V0X2JnX3BpY3R1cmVfY2VudGVyX3RpbGUoZmlsZXBhdGgsU2hhcGUpIGFuZCBkbyBub3QgcmVzaXplXG4iICsgX2ltYWdlX2ZpbGVfcGF0aA0KDQoNCg==&lt;/d3p1:Script&gt;&lt;/d3p1:PackagedScript&gt;&lt;/AfterFillAction&gt;&lt;TextType&gt;TableDescription&lt;/TextType&gt;&lt;/FillerProperties&gt;&lt;Query xmlns:d2p1=&quot;http://www.forgetdata.com/ReportingSuite&quot;&gt;&lt;d2p1:ColumnCombinationSettings /&gt;&lt;d2p1:Items&gt;&lt;d2p1:DataQueryItem&gt;&lt;d2p1:ColumnSelection&gt;/0[1]&lt;/d2p1:ColumnSelection&gt;&lt;d2p1:ConnectionName&gt;Item0&lt;/d2p1:ConnectionName&gt;&lt;d2p1:DataQueryType&gt;SelectCell&lt;/d2p1:DataQueryType&gt;&lt;d2p1:RowSelection&gt;/0[1]&lt;/d2p1:RowSelection&gt;&lt;d2p1:TableName&gt;Table26&lt;/d2p1:TableName&gt;&lt;/d2p1:DataQueryItem&gt;&lt;/d2p1:Items&gt;&lt;d2p1:RowCombinationSettings /&gt;&lt;/Query&gt;&lt;Version&gt;4.2.0.0&lt;/Version&gt;&lt;/ShapeLink&gt;"/>
 </p:tagLst>
 </file>
 
 <file path=ppt/tags/tag23.xml><?xml version="1.0" encoding="utf-8"?>
 <p:tagLst xmlns:a="http://schemas.openxmlformats.org/drawingml/2006/main" xmlns:r="http://schemas.openxmlformats.org/officeDocument/2006/relationships" xmlns:p="http://schemas.openxmlformats.org/presentationml/2006/main">
-  <p:tag name="HTTP://WWW.FORGETDATA.COM/SLIDES/4" val="&lt;?xml version=&quot;1.0&quot; encoding=&quot;utf-16&quot;?&gt;&lt;ShapeLink xmlns:i=&quot;http://www.w3.org/2001/XMLSchema-instance&quot; xmlns=&quot;http://www.forgetdata.com/Slides&quot;&gt;&lt;FillerProperties i:type=&quot;GenericTableInformationFiller.TableInfoFillerSettings&quot;&gt;&lt;AfterFillAction xmlns:d3p1=&quot;http://www.forgetdata.com/ReportingSuite&quot;&gt;&lt;d3p1:PackagedScript&gt;&lt;d3p1:CreatedBy&gt;ccurson&lt;/d3p1:CreatedBy&gt;&lt;d3p1:LastUpdated&gt;2016-02-16T14:41:37.6535405+00:00&lt;/d3p1:LastUpdated&gt;&lt;d3p1:Script&gt;aW1wb3J0IHRleHRzDQpfaW1hZ2VfZmlsZV9wYXRoPSJ0cmFuc2Zvcm1hdGlvbnNcXHV0aWxzXFxpbWFnZXNcXGdyZWVuYXJyb3cucG5nIg0KdGV4dHMuc2V0X2JnX3BpY3R1cmVfY2VudGVyX3RpbGUoX2ltYWdlX2ZpbGVfcGF0aCwgU2hhcGUp&lt;/d3p1:Script&gt;&lt;/d3p1:PackagedScript&gt;&lt;/AfterFillAction&gt;&lt;TextType&gt;TableDescription&lt;/TextType&gt;&lt;/FillerProperties&gt;&lt;Query xmlns:d2p1=&quot;http://www.forgetdata.com/ReportingSuite&quot;&gt;&lt;d2p1:ColumnCombinationSettings /&gt;&lt;d2p1:Items&gt;&lt;d2p1:DataQueryItem&gt;&lt;d2p1:ColumnSelection&gt;/0[1]&lt;/d2p1:ColumnSelection&gt;&lt;d2p1:ConnectionName&gt;Item0&lt;/d2p1:ConnectionName&gt;&lt;d2p1:DataQueryType&gt;SelectCell&lt;/d2p1:DataQueryType&gt;&lt;d2p1:RowSelection&gt;/0[1]&lt;/d2p1:RowSelection&gt;&lt;d2p1:TableName&gt;Table26&lt;/d2p1:TableName&gt;&lt;/d2p1:DataQueryItem&gt;&lt;/d2p1:Items&gt;&lt;d2p1:RowCombinationSettings /&gt;&lt;/Query&gt;&lt;Version&gt;4.2.0.0&lt;/Version&gt;&lt;/ShapeLink&gt;"/>
+  <p:tag name="HTTP://WWW.FORGETDATA.COM/SLIDES/4" val="&lt;?xml version=&quot;1.0&quot; encoding=&quot;utf-16&quot;?&gt;&lt;ShapeLink xmlns:i=&quot;http://www.w3.org/2001/XMLSchema-instance&quot; xmlns=&quot;http://www.forgetdata.com/Slides&quot;&gt;&lt;FillerProperties i:type=&quot;GenericTableInformationFiller.TableInfoFillerSettings&quot;&gt;&lt;AfterFillAction xmlns:d3p1=&quot;http://www.forgetdata.com/ReportingSuite&quot;&gt;&lt;d3p1:PackagedScript&gt;&lt;d3p1:CreatedBy&gt;ccurson&lt;/d3p1:CreatedBy&gt;&lt;d3p1:LastUpdated&gt;2016-10-27T14:45:07.8280964+01:00&lt;/d3p1:LastUpdated&gt;&lt;d3p1:Script&gt;aW1wb3J0IHRleHRzDQpfaW1hZ2VfZmlsZV9wYXRoPSJ0cmFuc2Zvcm1hdGlvbnNcXHV0aWxzXFxpbWFnZXNcXGdyZWVuYXJyb3cucG5nIg0KdGV4dHMuc2V0X2JnX3BpY3R1cmVfY2VudGVyX3RpbGUoX2ltYWdlX2ZpbGVfcGF0aCwgU2hhcGUp&lt;/d3p1:Script&gt;&lt;/d3p1:PackagedScript&gt;&lt;/AfterFillAction&gt;&lt;TextType&gt;TableDescription&lt;/TextType&gt;&lt;/FillerProperties&gt;&lt;Query xmlns:d2p1=&quot;http://www.forgetdata.com/ReportingSuite&quot;&gt;&lt;d2p1:ColumnCombinationSettings /&gt;&lt;d2p1:Items&gt;&lt;d2p1:DataQueryItem&gt;&lt;d2p1:ColumnSelection&gt;/0[1]&lt;/d2p1:ColumnSelection&gt;&lt;d2p1:ConnectionName&gt;Item0&lt;/d2p1:ConnectionName&gt;&lt;d2p1:DataQueryType&gt;SelectCell&lt;/d2p1:DataQueryType&gt;&lt;d2p1:RowSelection&gt;/0[1]&lt;/d2p1:RowSelection&gt;&lt;d2p1:TableName&gt;Table26&lt;/d2p1:TableName&gt;&lt;/d2p1:DataQueryItem&gt;&lt;/d2p1:Items&gt;&lt;d2p1:RowCombinationSettings /&gt;&lt;d2p1:Transformation&gt;&lt;d2p1:PackagedScript&gt;&lt;d2p1:CreatedBy&gt;ccurson&lt;/d2p1:CreatedBy&gt;&lt;d2p1:LastUpdated&gt;2016-10-27T14:45:07.7415945+01:00&lt;/d2p1:LastUpdated&gt;&lt;d2p1:Script&gt;TWF0cml4LkxhYmVsID0gImdyZWVuYXJyb3cucG5nIg==&lt;/d2p1:Script&gt;&lt;/d2p1:PackagedScript&gt;&lt;/d2p1:Transformation&gt;&lt;/Query&gt;&lt;Version&gt;4.2.0.0&lt;/Version&gt;&lt;/ShapeLink&gt;"/>
 </p:tagLst>
 </file>
 

</xml_diff>